<commit_message>
update of the Ubicast logo
</commit_message>
<xml_diff>
--- a/ubicast/preroll_pts2022 - 16x9 v2.pptx
+++ b/ubicast/preroll_pts2022 - 16x9 v2.pptx
@@ -3201,13 +3201,13 @@
   <p:clrMapOvr>
     <a:masterClrMapping/>
   </p:clrMapOvr>
-  <mc:AlternateContent xmlns:mc="http://schemas.openxmlformats.org/markup-compatibility/2006">
-    <mc:Choice xmlns:p14="http://schemas.microsoft.com/office/powerpoint/2010/main" Requires="p14">
+  <mc:AlternateContent xmlns:mc="http://schemas.openxmlformats.org/markup-compatibility/2006" xmlns:p14="http://schemas.microsoft.com/office/powerpoint/2010/main">
+    <mc:Choice Requires="p14">
       <p:transition spd="slow" p14:dur="1500" advClick="0" advTm="3000">
         <p14:warp dir="in"/>
       </p:transition>
     </mc:Choice>
-    <mc:Fallback>
+    <mc:Fallback xmlns="">
       <p:transition spd="slow" advClick="0" advTm="3000">
         <p:fade/>
       </p:transition>
@@ -3619,13 +3619,21 @@
           <p:nvPr/>
         </p:nvPicPr>
         <p:blipFill>
-          <a:blip r:embed="rId3"/>
-          <a:stretch/>
+          <a:blip r:embed="rId3" cstate="print">
+            <a:extLst>
+              <a:ext uri="{28A0092B-C50C-407E-A947-70E740481C1C}">
+                <a14:useLocalDpi xmlns:a14="http://schemas.microsoft.com/office/drawing/2010/main" val="0"/>
+              </a:ext>
+            </a:extLst>
+          </a:blip>
+          <a:stretch>
+            <a:fillRect/>
+          </a:stretch>
         </p:blipFill>
         <p:spPr>
           <a:xfrm>
-            <a:off x="4502160" y="4436640"/>
-            <a:ext cx="1942200" cy="531360"/>
+            <a:off x="4509715" y="4436640"/>
+            <a:ext cx="1927089" cy="531360"/>
           </a:xfrm>
           <a:prstGeom prst="rect">
             <a:avLst/>
@@ -3983,13 +3991,13 @@
   <p:clrMapOvr>
     <a:masterClrMapping/>
   </p:clrMapOvr>
-  <mc:AlternateContent xmlns:mc="http://schemas.openxmlformats.org/markup-compatibility/2006">
-    <mc:Choice xmlns:p14="http://schemas.microsoft.com/office/powerpoint/2010/main" Requires="p14">
+  <mc:AlternateContent xmlns:mc="http://schemas.openxmlformats.org/markup-compatibility/2006" xmlns:p14="http://schemas.microsoft.com/office/powerpoint/2010/main">
+    <mc:Choice Requires="p14">
       <p:transition spd="slow" p14:dur="1500" advTm="3000">
         <p14:warp dir="in"/>
       </p:transition>
     </mc:Choice>
-    <mc:Fallback>
+    <mc:Fallback xmlns="">
       <p:transition spd="slow" advTm="3000">
         <p:fade/>
       </p:transition>
@@ -4085,13 +4093,13 @@
   <p:clrMapOvr>
     <a:masterClrMapping/>
   </p:clrMapOvr>
-  <mc:AlternateContent xmlns:mc="http://schemas.openxmlformats.org/markup-compatibility/2006">
-    <mc:Choice xmlns:p14="http://schemas.microsoft.com/office/powerpoint/2010/main" Requires="p14">
+  <mc:AlternateContent xmlns:mc="http://schemas.openxmlformats.org/markup-compatibility/2006" xmlns:p14="http://schemas.microsoft.com/office/powerpoint/2010/main">
+    <mc:Choice Requires="p14">
       <p:transition spd="slow" p14:dur="1500" advTm="3000">
         <p14:warp dir="in"/>
       </p:transition>
     </mc:Choice>
-    <mc:Fallback>
+    <mc:Fallback xmlns="">
       <p:transition spd="slow" advTm="3000">
         <p:fade/>
       </p:transition>

</xml_diff>